<commit_message>
updated presentation and readme file
</commit_message>
<xml_diff>
--- a/To Do List Web Application.pptx
+++ b/To Do List Web Application.pptx
@@ -4326,15 +4326,154 @@
             <p:ph idx="1"/>
           </p:nvPr>
         </p:nvSpPr>
-        <p:spPr/>
+        <p:spPr>
+          <a:xfrm>
+            <a:off x="1066800" y="2103120"/>
+            <a:ext cx="5029200" cy="3849624"/>
+          </a:xfrm>
+        </p:spPr>
         <p:txBody>
           <a:bodyPr/>
           <a:lstStyle/>
           <a:p>
+            <a:r>
+              <a:rPr lang="en-GB" dirty="0"/>
+              <a:t>Created a task list which contained:</a:t>
+            </a:r>
+          </a:p>
+          <a:p>
+            <a:r>
+              <a:rPr lang="en-GB" dirty="0"/>
+              <a:t>id</a:t>
+            </a:r>
+          </a:p>
+          <a:p>
+            <a:r>
+              <a:rPr lang="en-GB" dirty="0"/>
+              <a:t>Title</a:t>
+            </a:r>
+          </a:p>
+          <a:p>
+            <a:r>
+              <a:rPr lang="en-GB" dirty="0"/>
+              <a:t>Task</a:t>
+            </a:r>
+          </a:p>
+          <a:p>
+            <a:r>
+              <a:rPr lang="en-GB" dirty="0"/>
+              <a:t>Type</a:t>
+            </a:r>
+          </a:p>
+          <a:p>
             <a:endParaRPr lang="en-GB" dirty="0"/>
           </a:p>
-        </p:txBody>
-      </p:sp>
+          <a:p>
+            <a:r>
+              <a:rPr lang="en-GB" dirty="0"/>
+              <a:t>An example of this would be:</a:t>
+            </a:r>
+          </a:p>
+          <a:p>
+            <a:endParaRPr lang="en-GB" dirty="0"/>
+          </a:p>
+        </p:txBody>
+      </p:sp>
+      <p:pic>
+        <p:nvPicPr>
+          <p:cNvPr id="5" name="Picture 4">
+            <a:extLst>
+              <a:ext uri="{FF2B5EF4-FFF2-40B4-BE49-F238E27FC236}">
+                <a16:creationId xmlns:a16="http://schemas.microsoft.com/office/drawing/2014/main" id="{97B8FB97-3692-4651-91BB-B2FF9A0F75D8}"/>
+              </a:ext>
+            </a:extLst>
+          </p:cNvPr>
+          <p:cNvPicPr>
+            <a:picLocks noChangeAspect="1"/>
+          </p:cNvPicPr>
+          <p:nvPr/>
+        </p:nvPicPr>
+        <p:blipFill>
+          <a:blip r:embed="rId2"/>
+          <a:stretch>
+            <a:fillRect/>
+          </a:stretch>
+        </p:blipFill>
+        <p:spPr>
+          <a:xfrm>
+            <a:off x="1066799" y="4762119"/>
+            <a:ext cx="3122645" cy="1524729"/>
+          </a:xfrm>
+          <a:prstGeom prst="rect">
+            <a:avLst/>
+          </a:prstGeom>
+        </p:spPr>
+      </p:pic>
+      <p:sp>
+        <p:nvSpPr>
+          <p:cNvPr id="6" name="TextBox 5">
+            <a:extLst>
+              <a:ext uri="{FF2B5EF4-FFF2-40B4-BE49-F238E27FC236}">
+                <a16:creationId xmlns:a16="http://schemas.microsoft.com/office/drawing/2014/main" id="{E84BE1E7-F89C-49CD-AE1E-D7D278AFBC0E}"/>
+              </a:ext>
+            </a:extLst>
+          </p:cNvPr>
+          <p:cNvSpPr txBox="1"/>
+          <p:nvPr/>
+        </p:nvSpPr>
+        <p:spPr>
+          <a:xfrm>
+            <a:off x="6096000" y="2014194"/>
+            <a:ext cx="5184710" cy="646331"/>
+          </a:xfrm>
+          <a:prstGeom prst="rect">
+            <a:avLst/>
+          </a:prstGeom>
+          <a:noFill/>
+        </p:spPr>
+        <p:txBody>
+          <a:bodyPr wrap="square" rtlCol="0">
+            <a:spAutoFit/>
+          </a:bodyPr>
+          <a:lstStyle/>
+          <a:p>
+            <a:r>
+              <a:rPr lang="en-GB" dirty="0"/>
+              <a:t>This was created in a many to one relationship with day</a:t>
+            </a:r>
+          </a:p>
+        </p:txBody>
+      </p:sp>
+      <p:pic>
+        <p:nvPicPr>
+          <p:cNvPr id="8" name="Picture 7">
+            <a:extLst>
+              <a:ext uri="{FF2B5EF4-FFF2-40B4-BE49-F238E27FC236}">
+                <a16:creationId xmlns:a16="http://schemas.microsoft.com/office/drawing/2014/main" id="{DE8560E3-CB0A-4024-A247-0C4B51580524}"/>
+              </a:ext>
+            </a:extLst>
+          </p:cNvPr>
+          <p:cNvPicPr>
+            <a:picLocks noChangeAspect="1"/>
+          </p:cNvPicPr>
+          <p:nvPr/>
+        </p:nvPicPr>
+        <p:blipFill>
+          <a:blip r:embed="rId3"/>
+          <a:stretch>
+            <a:fillRect/>
+          </a:stretch>
+        </p:blipFill>
+        <p:spPr>
+          <a:xfrm>
+            <a:off x="6096000" y="2749451"/>
+            <a:ext cx="2309738" cy="1524729"/>
+          </a:xfrm>
+          <a:prstGeom prst="rect">
+            <a:avLst/>
+          </a:prstGeom>
+        </p:spPr>
+      </p:pic>
     </p:spTree>
     <p:extLst>
       <p:ext uri="{BB962C8B-B14F-4D97-AF65-F5344CB8AC3E}">
@@ -4383,12 +4522,14 @@
         </p:nvSpPr>
         <p:spPr/>
         <p:txBody>
-          <a:bodyPr/>
+          <a:bodyPr>
+            <a:normAutofit/>
+          </a:bodyPr>
           <a:lstStyle/>
           <a:p>
             <a:r>
-              <a:rPr lang="en-GB" dirty="0"/>
-              <a:t>Spring Plan</a:t>
+              <a:rPr lang="en-GB" sz="3600" dirty="0"/>
+              <a:t>Spring Plan- what was needed:</a:t>
             </a:r>
           </a:p>
         </p:txBody>
@@ -4409,15 +4550,107 @@
             <p:ph idx="1"/>
           </p:nvPr>
         </p:nvSpPr>
-        <p:spPr/>
+        <p:spPr>
+          <a:xfrm>
+            <a:off x="1066800" y="2103120"/>
+            <a:ext cx="5029200" cy="3849624"/>
+          </a:xfrm>
+        </p:spPr>
         <p:txBody>
           <a:bodyPr/>
           <a:lstStyle/>
           <a:p>
-            <a:endParaRPr lang="en-GB"/>
-          </a:p>
-        </p:txBody>
-      </p:sp>
+            <a:r>
+              <a:rPr lang="en-GB" dirty="0"/>
+              <a:t>App config</a:t>
+            </a:r>
+          </a:p>
+          <a:p>
+            <a:r>
+              <a:rPr lang="en-GB" dirty="0"/>
+              <a:t>DTO</a:t>
+            </a:r>
+          </a:p>
+          <a:p>
+            <a:r>
+              <a:rPr lang="en-GB" dirty="0"/>
+              <a:t>Exceptions</a:t>
+            </a:r>
+          </a:p>
+          <a:p>
+            <a:r>
+              <a:rPr lang="en-GB" dirty="0"/>
+              <a:t>Day and Task domain</a:t>
+            </a:r>
+          </a:p>
+          <a:p>
+            <a:r>
+              <a:rPr lang="en-GB" dirty="0"/>
+              <a:t>Repositories for both task and day</a:t>
+            </a:r>
+          </a:p>
+          <a:p>
+            <a:r>
+              <a:rPr lang="en-GB" dirty="0"/>
+              <a:t>Controllers for both task and day</a:t>
+            </a:r>
+          </a:p>
+          <a:p>
+            <a:r>
+              <a:rPr lang="en-GB" dirty="0"/>
+              <a:t>Services for both task and day</a:t>
+            </a:r>
+          </a:p>
+          <a:p>
+            <a:r>
+              <a:rPr lang="en-GB" dirty="0"/>
+              <a:t>A utils class to manage beans</a:t>
+            </a:r>
+          </a:p>
+          <a:p>
+            <a:r>
+              <a:rPr lang="en-GB" dirty="0"/>
+              <a:t>Selenium Tests</a:t>
+            </a:r>
+          </a:p>
+          <a:p>
+            <a:r>
+              <a:rPr lang="en-GB" dirty="0"/>
+              <a:t>Junit tests</a:t>
+            </a:r>
+          </a:p>
+        </p:txBody>
+      </p:sp>
+      <p:pic>
+        <p:nvPicPr>
+          <p:cNvPr id="5" name="Picture 4">
+            <a:extLst>
+              <a:ext uri="{FF2B5EF4-FFF2-40B4-BE49-F238E27FC236}">
+                <a16:creationId xmlns:a16="http://schemas.microsoft.com/office/drawing/2014/main" id="{2D857C97-0B39-41D2-B7FE-FC6F279A0107}"/>
+              </a:ext>
+            </a:extLst>
+          </p:cNvPr>
+          <p:cNvPicPr>
+            <a:picLocks noChangeAspect="1"/>
+          </p:cNvPicPr>
+          <p:nvPr/>
+        </p:nvPicPr>
+        <p:blipFill>
+          <a:blip r:embed="rId2"/>
+          <a:stretch>
+            <a:fillRect/>
+          </a:stretch>
+        </p:blipFill>
+        <p:spPr>
+          <a:xfrm>
+            <a:off x="8520404" y="1043331"/>
+            <a:ext cx="2895600" cy="5172075"/>
+          </a:xfrm>
+          <a:prstGeom prst="rect">
+            <a:avLst/>
+          </a:prstGeom>
+        </p:spPr>
+      </p:pic>
     </p:spTree>
     <p:extLst>
       <p:ext uri="{BB962C8B-B14F-4D97-AF65-F5344CB8AC3E}">
@@ -4497,7 +4730,55 @@
           <a:bodyPr/>
           <a:lstStyle/>
           <a:p>
-            <a:endParaRPr lang="en-GB"/>
+            <a:r>
+              <a:rPr lang="en-GB" dirty="0"/>
+              <a:t>Throughout this project I was introduced to new languages and technologies, these are:</a:t>
+            </a:r>
+          </a:p>
+          <a:p>
+            <a:r>
+              <a:rPr lang="en-GB" dirty="0"/>
+              <a:t>Spring (back end API dev platform)</a:t>
+            </a:r>
+          </a:p>
+          <a:p>
+            <a:r>
+              <a:rPr lang="en-GB" dirty="0"/>
+              <a:t>Java (back end)</a:t>
+            </a:r>
+          </a:p>
+          <a:p>
+            <a:r>
+              <a:rPr lang="en-GB" dirty="0"/>
+              <a:t>HTML (front end)</a:t>
+            </a:r>
+          </a:p>
+          <a:p>
+            <a:r>
+              <a:rPr lang="en-GB" dirty="0"/>
+              <a:t>JavaScript (front end)</a:t>
+            </a:r>
+          </a:p>
+          <a:p>
+            <a:r>
+              <a:rPr lang="en-GB" dirty="0"/>
+              <a:t>CSS (front end) (not used in project)</a:t>
+            </a:r>
+          </a:p>
+          <a:p>
+            <a:r>
+              <a:rPr lang="en-GB" dirty="0"/>
+              <a:t>Postman (API tool)</a:t>
+            </a:r>
+          </a:p>
+          <a:p>
+            <a:r>
+              <a:rPr lang="en-GB" dirty="0"/>
+              <a:t>Selenium (UI testing)</a:t>
+            </a:r>
+          </a:p>
+          <a:p>
+            <a:endParaRPr lang="en-GB" dirty="0"/>
           </a:p>
         </p:txBody>
       </p:sp>
@@ -4559,28 +4840,229 @@
           </a:p>
         </p:txBody>
       </p:sp>
-      <p:sp>
-        <p:nvSpPr>
-          <p:cNvPr id="3" name="Content Placeholder 2">
+      <p:pic>
+        <p:nvPicPr>
+          <p:cNvPr id="5" name="Picture 4">
             <a:extLst>
               <a:ext uri="{FF2B5EF4-FFF2-40B4-BE49-F238E27FC236}">
-                <a16:creationId xmlns:a16="http://schemas.microsoft.com/office/drawing/2014/main" id="{FCBBBC3D-59C2-4A74-A928-0454AEDEF900}"/>
+                <a16:creationId xmlns:a16="http://schemas.microsoft.com/office/drawing/2014/main" id="{137D470E-8CCC-46FA-BABE-B733264D918C}"/>
               </a:ext>
             </a:extLst>
           </p:cNvPr>
-          <p:cNvSpPr>
-            <a:spLocks noGrp="1"/>
-          </p:cNvSpPr>
-          <p:nvPr>
-            <p:ph idx="1"/>
-          </p:nvPr>
-        </p:nvSpPr>
-        <p:spPr/>
-        <p:txBody>
-          <a:bodyPr/>
+          <p:cNvPicPr>
+            <a:picLocks noChangeAspect="1"/>
+          </p:cNvPicPr>
+          <p:nvPr/>
+        </p:nvPicPr>
+        <p:blipFill>
+          <a:blip r:embed="rId2"/>
+          <a:stretch>
+            <a:fillRect/>
+          </a:stretch>
+        </p:blipFill>
+        <p:spPr>
+          <a:xfrm>
+            <a:off x="416767" y="4237070"/>
+            <a:ext cx="4799192" cy="2182391"/>
+          </a:xfrm>
+          <a:prstGeom prst="rect">
+            <a:avLst/>
+          </a:prstGeom>
+        </p:spPr>
+      </p:pic>
+      <p:pic>
+        <p:nvPicPr>
+          <p:cNvPr id="7" name="Picture 6">
+            <a:extLst>
+              <a:ext uri="{FF2B5EF4-FFF2-40B4-BE49-F238E27FC236}">
+                <a16:creationId xmlns:a16="http://schemas.microsoft.com/office/drawing/2014/main" id="{DB67955B-290E-4365-ADE1-AC6A7A23C506}"/>
+              </a:ext>
+            </a:extLst>
+          </p:cNvPr>
+          <p:cNvPicPr>
+            <a:picLocks noChangeAspect="1"/>
+          </p:cNvPicPr>
+          <p:nvPr/>
+        </p:nvPicPr>
+        <p:blipFill>
+          <a:blip r:embed="rId3"/>
+          <a:stretch>
+            <a:fillRect/>
+          </a:stretch>
+        </p:blipFill>
+        <p:spPr>
+          <a:xfrm>
+            <a:off x="541370" y="2197456"/>
+            <a:ext cx="1200150" cy="1362075"/>
+          </a:xfrm>
+          <a:prstGeom prst="rect">
+            <a:avLst/>
+          </a:prstGeom>
+        </p:spPr>
+      </p:pic>
+      <p:sp>
+        <p:nvSpPr>
+          <p:cNvPr id="8" name="TextBox 7">
+            <a:extLst>
+              <a:ext uri="{FF2B5EF4-FFF2-40B4-BE49-F238E27FC236}">
+                <a16:creationId xmlns:a16="http://schemas.microsoft.com/office/drawing/2014/main" id="{2EFE9B5F-CDDD-4B22-B059-0F1ABC593885}"/>
+              </a:ext>
+            </a:extLst>
+          </p:cNvPr>
+          <p:cNvSpPr txBox="1"/>
+          <p:nvPr/>
+        </p:nvSpPr>
+        <p:spPr>
+          <a:xfrm>
+            <a:off x="2230016" y="2197456"/>
+            <a:ext cx="2985943" cy="646331"/>
+          </a:xfrm>
+          <a:prstGeom prst="rect">
+            <a:avLst/>
+          </a:prstGeom>
+          <a:noFill/>
+        </p:spPr>
+        <p:txBody>
+          <a:bodyPr wrap="square" rtlCol="0">
+            <a:spAutoFit/>
+          </a:bodyPr>
           <a:lstStyle/>
           <a:p>
-            <a:endParaRPr lang="en-GB"/>
+            <a:r>
+              <a:rPr lang="en-GB" dirty="0"/>
+              <a:t>Back end CI was hardly used</a:t>
+            </a:r>
+          </a:p>
+        </p:txBody>
+      </p:sp>
+      <p:pic>
+        <p:nvPicPr>
+          <p:cNvPr id="10" name="Picture 9">
+            <a:extLst>
+              <a:ext uri="{FF2B5EF4-FFF2-40B4-BE49-F238E27FC236}">
+                <a16:creationId xmlns:a16="http://schemas.microsoft.com/office/drawing/2014/main" id="{8EE541D2-C48F-4EA4-B6B6-C837BE013A46}"/>
+              </a:ext>
+            </a:extLst>
+          </p:cNvPr>
+          <p:cNvPicPr>
+            <a:picLocks noChangeAspect="1"/>
+          </p:cNvPicPr>
+          <p:nvPr/>
+        </p:nvPicPr>
+        <p:blipFill>
+          <a:blip r:embed="rId4"/>
+          <a:stretch>
+            <a:fillRect/>
+          </a:stretch>
+        </p:blipFill>
+        <p:spPr>
+          <a:xfrm>
+            <a:off x="5365101" y="3482455"/>
+            <a:ext cx="6410131" cy="2976132"/>
+          </a:xfrm>
+          <a:prstGeom prst="rect">
+            <a:avLst/>
+          </a:prstGeom>
+        </p:spPr>
+      </p:pic>
+      <p:cxnSp>
+        <p:nvCxnSpPr>
+          <p:cNvPr id="12" name="Straight Connector 11">
+            <a:extLst>
+              <a:ext uri="{FF2B5EF4-FFF2-40B4-BE49-F238E27FC236}">
+                <a16:creationId xmlns:a16="http://schemas.microsoft.com/office/drawing/2014/main" id="{22758F11-772D-47FD-BFAE-C045CA8D2FB1}"/>
+              </a:ext>
+            </a:extLst>
+          </p:cNvPr>
+          <p:cNvCxnSpPr/>
+          <p:nvPr/>
+        </p:nvCxnSpPr>
+        <p:spPr>
+          <a:xfrm flipV="1">
+            <a:off x="5365101" y="438539"/>
+            <a:ext cx="0" cy="5980922"/>
+          </a:xfrm>
+          <a:prstGeom prst="line">
+            <a:avLst/>
+          </a:prstGeom>
+        </p:spPr>
+        <p:style>
+          <a:lnRef idx="1">
+            <a:schemeClr val="accent1"/>
+          </a:lnRef>
+          <a:fillRef idx="0">
+            <a:schemeClr val="accent1"/>
+          </a:fillRef>
+          <a:effectRef idx="0">
+            <a:schemeClr val="accent1"/>
+          </a:effectRef>
+          <a:fontRef idx="minor">
+            <a:schemeClr val="tx1"/>
+          </a:fontRef>
+        </p:style>
+      </p:cxnSp>
+      <p:pic>
+        <p:nvPicPr>
+          <p:cNvPr id="14" name="Picture 13">
+            <a:extLst>
+              <a:ext uri="{FF2B5EF4-FFF2-40B4-BE49-F238E27FC236}">
+                <a16:creationId xmlns:a16="http://schemas.microsoft.com/office/drawing/2014/main" id="{423C43CE-94A1-4388-8F1A-A1CD6CAA4BCE}"/>
+              </a:ext>
+            </a:extLst>
+          </p:cNvPr>
+          <p:cNvPicPr>
+            <a:picLocks noChangeAspect="1"/>
+          </p:cNvPicPr>
+          <p:nvPr/>
+        </p:nvPicPr>
+        <p:blipFill>
+          <a:blip r:embed="rId5"/>
+          <a:stretch>
+            <a:fillRect/>
+          </a:stretch>
+        </p:blipFill>
+        <p:spPr>
+          <a:xfrm>
+            <a:off x="5559101" y="1815771"/>
+            <a:ext cx="2686050" cy="1409700"/>
+          </a:xfrm>
+          <a:prstGeom prst="rect">
+            <a:avLst/>
+          </a:prstGeom>
+        </p:spPr>
+      </p:pic>
+      <p:sp>
+        <p:nvSpPr>
+          <p:cNvPr id="15" name="TextBox 14">
+            <a:extLst>
+              <a:ext uri="{FF2B5EF4-FFF2-40B4-BE49-F238E27FC236}">
+                <a16:creationId xmlns:a16="http://schemas.microsoft.com/office/drawing/2014/main" id="{897F6685-91EC-42BD-9A5B-07D7F25C4E69}"/>
+              </a:ext>
+            </a:extLst>
+          </p:cNvPr>
+          <p:cNvSpPr txBox="1"/>
+          <p:nvPr/>
+        </p:nvSpPr>
+        <p:spPr>
+          <a:xfrm>
+            <a:off x="8607100" y="1815771"/>
+            <a:ext cx="3043530" cy="1477328"/>
+          </a:xfrm>
+          <a:prstGeom prst="rect">
+            <a:avLst/>
+          </a:prstGeom>
+          <a:noFill/>
+        </p:spPr>
+        <p:txBody>
+          <a:bodyPr wrap="square" rtlCol="0">
+            <a:spAutoFit/>
+          </a:bodyPr>
+          <a:lstStyle/>
+          <a:p>
+            <a:r>
+              <a:rPr lang="en-GB" dirty="0"/>
+              <a:t>Front end was used more, creating a separate branch (and merged) for presentation and other dev additions</a:t>
+            </a:r>
           </a:p>
         </p:txBody>
       </p:sp>
@@ -4658,15 +5140,53 @@
             <p:ph idx="1"/>
           </p:nvPr>
         </p:nvSpPr>
-        <p:spPr/>
+        <p:spPr>
+          <a:xfrm>
+            <a:off x="1066800" y="2103120"/>
+            <a:ext cx="5029200" cy="3849624"/>
+          </a:xfrm>
+        </p:spPr>
         <p:txBody>
           <a:bodyPr/>
           <a:lstStyle/>
           <a:p>
-            <a:endParaRPr lang="en-GB"/>
-          </a:p>
-        </p:txBody>
-      </p:sp>
+            <a:r>
+              <a:rPr lang="en-GB" dirty="0"/>
+              <a:t>Used red green refactor for unit, integration testing and selenium testing to a standard of 80.7%</a:t>
+            </a:r>
+          </a:p>
+        </p:txBody>
+      </p:sp>
+      <p:pic>
+        <p:nvPicPr>
+          <p:cNvPr id="5" name="Picture 4">
+            <a:extLst>
+              <a:ext uri="{FF2B5EF4-FFF2-40B4-BE49-F238E27FC236}">
+                <a16:creationId xmlns:a16="http://schemas.microsoft.com/office/drawing/2014/main" id="{EE2E5D44-C85B-4614-8068-9C0037EA81E9}"/>
+              </a:ext>
+            </a:extLst>
+          </p:cNvPr>
+          <p:cNvPicPr>
+            <a:picLocks noChangeAspect="1"/>
+          </p:cNvPicPr>
+          <p:nvPr/>
+        </p:nvPicPr>
+        <p:blipFill>
+          <a:blip r:embed="rId2"/>
+          <a:stretch>
+            <a:fillRect/>
+          </a:stretch>
+        </p:blipFill>
+        <p:spPr>
+          <a:xfrm>
+            <a:off x="7122367" y="2014194"/>
+            <a:ext cx="4074367" cy="4160143"/>
+          </a:xfrm>
+          <a:prstGeom prst="rect">
+            <a:avLst/>
+          </a:prstGeom>
+        </p:spPr>
+      </p:pic>
     </p:spTree>
     <p:extLst>
       <p:ext uri="{BB962C8B-B14F-4D97-AF65-F5344CB8AC3E}">
@@ -4746,7 +5266,10 @@
           <a:bodyPr/>
           <a:lstStyle/>
           <a:p>
-            <a:endParaRPr lang="en-GB"/>
+            <a:r>
+              <a:rPr lang="en-GB" dirty="0"/>
+              <a:t>I will now show you a demo of the code I have created.</a:t>
+            </a:r>
           </a:p>
         </p:txBody>
       </p:sp>
@@ -4796,9 +5319,16 @@
             <p:ph type="title"/>
           </p:nvPr>
         </p:nvSpPr>
-        <p:spPr/>
-        <p:txBody>
-          <a:bodyPr/>
+        <p:spPr>
+          <a:xfrm>
+            <a:off x="1066800" y="642594"/>
+            <a:ext cx="10058400" cy="1371600"/>
+          </a:xfrm>
+        </p:spPr>
+        <p:txBody>
+          <a:bodyPr anchor="ctr">
+            <a:normAutofit/>
+          </a:bodyPr>
           <a:lstStyle/>
           <a:p>
             <a:r>
@@ -4810,10 +5340,10 @@
       </p:sp>
       <p:sp>
         <p:nvSpPr>
-          <p:cNvPr id="3" name="Content Placeholder 2">
+          <p:cNvPr id="8" name="Content Placeholder 2">
             <a:extLst>
               <a:ext uri="{FF2B5EF4-FFF2-40B4-BE49-F238E27FC236}">
-                <a16:creationId xmlns:a16="http://schemas.microsoft.com/office/drawing/2014/main" id="{0125EE5F-BA2D-4EA2-A16D-6FE22A9E837C}"/>
+                <a16:creationId xmlns:a16="http://schemas.microsoft.com/office/drawing/2014/main" id="{E5FB4DC2-1977-44CB-A02E-8D465168F3F9}"/>
               </a:ext>
             </a:extLst>
           </p:cNvPr>
@@ -4821,15 +5351,152 @@
             <a:spLocks noGrp="1"/>
           </p:cNvSpPr>
           <p:nvPr>
-            <p:ph idx="1"/>
-          </p:nvPr>
-        </p:nvSpPr>
-        <p:spPr/>
-        <p:txBody>
-          <a:bodyPr/>
+            <p:ph sz="half" idx="1"/>
+          </p:nvPr>
+        </p:nvSpPr>
+        <p:spPr>
+          <a:xfrm>
+            <a:off x="1066800" y="2103120"/>
+            <a:ext cx="4663440" cy="3749040"/>
+          </a:xfrm>
+        </p:spPr>
+        <p:txBody>
+          <a:bodyPr>
+            <a:normAutofit fontScale="77500" lnSpcReduction="20000"/>
+          </a:bodyPr>
           <a:lstStyle/>
           <a:p>
-            <a:endParaRPr lang="en-GB"/>
+            <a:r>
+              <a:rPr lang="en-US" dirty="0"/>
+              <a:t>What went well:</a:t>
+            </a:r>
+          </a:p>
+          <a:p>
+            <a:r>
+              <a:rPr lang="en-US" dirty="0"/>
+              <a:t>Fully flushed out front end</a:t>
+            </a:r>
+          </a:p>
+          <a:p>
+            <a:r>
+              <a:rPr lang="en-US" dirty="0"/>
+              <a:t>High standard of testing</a:t>
+            </a:r>
+          </a:p>
+          <a:p>
+            <a:endParaRPr lang="en-US" dirty="0"/>
+          </a:p>
+          <a:p>
+            <a:r>
+              <a:rPr lang="en-US" dirty="0"/>
+              <a:t>To be improved:</a:t>
+            </a:r>
+          </a:p>
+          <a:p>
+            <a:r>
+              <a:rPr lang="en-US" dirty="0"/>
+              <a:t>Front end is at an operational level, didn’t get to fully flush out the front end, </a:t>
+            </a:r>
+          </a:p>
+        </p:txBody>
+      </p:sp>
+      <p:sp>
+        <p:nvSpPr>
+          <p:cNvPr id="10" name="Content Placeholder 3">
+            <a:extLst>
+              <a:ext uri="{FF2B5EF4-FFF2-40B4-BE49-F238E27FC236}">
+                <a16:creationId xmlns:a16="http://schemas.microsoft.com/office/drawing/2014/main" id="{32206756-6F78-43CB-A62A-FD122BF679A2}"/>
+              </a:ext>
+            </a:extLst>
+          </p:cNvPr>
+          <p:cNvSpPr>
+            <a:spLocks noGrp="1"/>
+          </p:cNvSpPr>
+          <p:nvPr>
+            <p:ph sz="half" idx="2"/>
+          </p:nvPr>
+        </p:nvSpPr>
+        <p:spPr>
+          <a:xfrm>
+            <a:off x="6461760" y="2103120"/>
+            <a:ext cx="4663440" cy="3749040"/>
+          </a:xfrm>
+        </p:spPr>
+        <p:txBody>
+          <a:bodyPr>
+            <a:normAutofit fontScale="77500" lnSpcReduction="20000"/>
+          </a:bodyPr>
+          <a:lstStyle/>
+          <a:p>
+            <a:r>
+              <a:rPr lang="en-US" dirty="0"/>
+              <a:t>Completed:</a:t>
+            </a:r>
+          </a:p>
+          <a:p>
+            <a:r>
+              <a:rPr lang="en-US" dirty="0"/>
+              <a:t>Java backend</a:t>
+            </a:r>
+          </a:p>
+          <a:p>
+            <a:r>
+              <a:rPr lang="en-US" dirty="0"/>
+              <a:t>Unit and integration testing</a:t>
+            </a:r>
+          </a:p>
+          <a:p>
+            <a:r>
+              <a:rPr lang="en-US" dirty="0"/>
+              <a:t>Selenium testing</a:t>
+            </a:r>
+          </a:p>
+          <a:p>
+            <a:r>
+              <a:rPr lang="en-US" dirty="0"/>
+              <a:t>HTML frontend (barely)</a:t>
+            </a:r>
+          </a:p>
+          <a:p>
+            <a:r>
+              <a:rPr lang="en-US" dirty="0"/>
+              <a:t>JavaScript (barely)</a:t>
+            </a:r>
+          </a:p>
+          <a:p>
+            <a:endParaRPr lang="en-US" dirty="0"/>
+          </a:p>
+          <a:p>
+            <a:r>
+              <a:rPr lang="en-US" dirty="0"/>
+              <a:t>What was left behind:</a:t>
+            </a:r>
+          </a:p>
+          <a:p>
+            <a:r>
+              <a:rPr lang="en-US" dirty="0"/>
+              <a:t>CSS to improve the visuals of the front end</a:t>
+            </a:r>
+          </a:p>
+          <a:p>
+            <a:r>
+              <a:rPr lang="en-US" dirty="0"/>
+              <a:t>Day implementation </a:t>
+            </a:r>
+            <a:r>
+              <a:rPr lang="en-US"/>
+              <a:t>to allow </a:t>
+            </a:r>
+            <a:r>
+              <a:rPr lang="en-US" dirty="0"/>
+              <a:t>for separate tables</a:t>
+            </a:r>
+          </a:p>
+          <a:p>
+            <a:r>
+              <a:rPr lang="en-US" dirty="0"/>
+              <a:t>Month implementation to allow for separate tables</a:t>
+            </a:r>
           </a:p>
         </p:txBody>
       </p:sp>
@@ -4912,7 +5579,47 @@
           <a:bodyPr/>
           <a:lstStyle/>
           <a:p>
-            <a:endParaRPr lang="en-GB"/>
+            <a:r>
+              <a:rPr lang="en-GB" dirty="0"/>
+              <a:t>With more time and learning I would have improved the visuals and functionality of the front end (HTML, </a:t>
+            </a:r>
+            <a:r>
+              <a:rPr lang="en-GB" dirty="0" err="1"/>
+              <a:t>Javascript</a:t>
+            </a:r>
+            <a:r>
+              <a:rPr lang="en-GB" dirty="0"/>
+              <a:t> and CSS)</a:t>
+            </a:r>
+          </a:p>
+          <a:p>
+            <a:r>
+              <a:rPr lang="en-GB" dirty="0"/>
+              <a:t>Would have implemented Days to allow for the creation of separate tables</a:t>
+            </a:r>
+          </a:p>
+          <a:p>
+            <a:r>
+              <a:rPr lang="en-GB" dirty="0"/>
+              <a:t>Would adjust the layout of the API to allow for months to function independently of </a:t>
+            </a:r>
+            <a:r>
+              <a:rPr lang="en-GB" dirty="0" err="1"/>
+              <a:t>eachother</a:t>
+            </a:r>
+            <a:endParaRPr lang="en-GB" dirty="0"/>
+          </a:p>
+          <a:p>
+            <a:endParaRPr lang="en-GB" dirty="0"/>
+          </a:p>
+          <a:p>
+            <a:endParaRPr lang="en-GB" dirty="0"/>
+          </a:p>
+          <a:p>
+            <a:r>
+              <a:rPr lang="en-GB" dirty="0"/>
+              <a:t>Thank you for listening, any questions?</a:t>
+            </a:r>
           </a:p>
         </p:txBody>
       </p:sp>
@@ -5206,24 +5913,6 @@
 </file>
 
 <file path=customXml/item1.xml><?xml version="1.0" encoding="utf-8"?>
-<p:properties xmlns:p="http://schemas.microsoft.com/office/2006/metadata/properties" xmlns:xsi="http://www.w3.org/2001/XMLSchema-instance" xmlns:pc="http://schemas.microsoft.com/office/infopath/2007/PartnerControls">
-  <documentManagement>
-    <Status xmlns="71af3243-3dd4-4a8d-8c0d-dd76da1f02a5">Not started</Status>
-    <MediaServiceKeyPoints xmlns="71af3243-3dd4-4a8d-8c0d-dd76da1f02a5" xsi:nil="true"/>
-  </documentManagement>
-</p:properties>
-</file>
-
-<file path=customXml/item2.xml><?xml version="1.0" encoding="utf-8"?>
-<?mso-contentType ?>
-<FormTemplates xmlns="http://schemas.microsoft.com/sharepoint/v3/contenttype/forms">
-  <Display>DocumentLibraryForm</Display>
-  <Edit>DocumentLibraryForm</Edit>
-  <New>DocumentLibraryForm</New>
-</FormTemplates>
-</file>
-
-<file path=customXml/item3.xml><?xml version="1.0" encoding="utf-8"?>
 <ct:contentTypeSchema xmlns:ct="http://schemas.microsoft.com/office/2006/metadata/contentType" xmlns:ma="http://schemas.microsoft.com/office/2006/metadata/properties/metaAttributes" ct:_="" ma:_="" ma:contentTypeName="Document" ma:contentTypeID="0x01010079F111ED35F8CC479449609E8A0923A6" ma:contentTypeVersion="12" ma:contentTypeDescription="Create a new document." ma:contentTypeScope="" ma:versionID="a410dd7f93c95333ffa1b60ed6adedd1">
   <xsd:schema xmlns:xsd="http://www.w3.org/2001/XMLSchema" xmlns:xs="http://www.w3.org/2001/XMLSchema" xmlns:p="http://schemas.microsoft.com/office/2006/metadata/properties" xmlns:ns2="71af3243-3dd4-4a8d-8c0d-dd76da1f02a5" xmlns:ns3="16c05727-aa75-4e4a-9b5f-8a80a1165891" targetNamespace="http://schemas.microsoft.com/office/2006/metadata/properties" ma:root="true" ma:fieldsID="a936d9baba76aa3866493feff160faab" ns2:_="" ns3:_="">
     <xsd:import namespace="71af3243-3dd4-4a8d-8c0d-dd76da1f02a5"/>
@@ -5444,25 +6133,25 @@
 </ct:contentTypeSchema>
 </file>
 
-<file path=customXml/itemProps1.xml><?xml version="1.0" encoding="utf-8"?>
-<ds:datastoreItem xmlns:ds="http://schemas.openxmlformats.org/officeDocument/2006/customXml" ds:itemID="{137651BA-F45C-4845-9AB3-E0A65B39F5E1}">
-  <ds:schemaRefs>
-    <ds:schemaRef ds:uri="http://schemas.microsoft.com/office/2006/metadata/properties"/>
-    <ds:schemaRef ds:uri="http://schemas.microsoft.com/office/infopath/2007/PartnerControls"/>
-    <ds:schemaRef ds:uri="71af3243-3dd4-4a8d-8c0d-dd76da1f02a5"/>
-  </ds:schemaRefs>
-</ds:datastoreItem>
+<file path=customXml/item2.xml><?xml version="1.0" encoding="utf-8"?>
+<?mso-contentType ?>
+<FormTemplates xmlns="http://schemas.microsoft.com/sharepoint/v3/contenttype/forms">
+  <Display>DocumentLibraryForm</Display>
+  <Edit>DocumentLibraryForm</Edit>
+  <New>DocumentLibraryForm</New>
+</FormTemplates>
 </file>
 
-<file path=customXml/itemProps2.xml><?xml version="1.0" encoding="utf-8"?>
-<ds:datastoreItem xmlns:ds="http://schemas.openxmlformats.org/officeDocument/2006/customXml" ds:itemID="{CDB58277-F8DF-46FF-84EC-EF41B835E69F}">
-  <ds:schemaRefs>
-    <ds:schemaRef ds:uri="http://schemas.microsoft.com/sharepoint/v3/contenttype/forms"/>
-  </ds:schemaRefs>
-</ds:datastoreItem>
+<file path=customXml/item3.xml><?xml version="1.0" encoding="utf-8"?>
+<p:properties xmlns:p="http://schemas.microsoft.com/office/2006/metadata/properties" xmlns:xsi="http://www.w3.org/2001/XMLSchema-instance" xmlns:pc="http://schemas.microsoft.com/office/infopath/2007/PartnerControls">
+  <documentManagement>
+    <Status xmlns="71af3243-3dd4-4a8d-8c0d-dd76da1f02a5">Not started</Status>
+    <MediaServiceKeyPoints xmlns="71af3243-3dd4-4a8d-8c0d-dd76da1f02a5" xsi:nil="true"/>
+  </documentManagement>
+</p:properties>
 </file>
 
-<file path=customXml/itemProps3.xml><?xml version="1.0" encoding="utf-8"?>
+<file path=customXml/itemProps1.xml><?xml version="1.0" encoding="utf-8"?>
 <ds:datastoreItem xmlns:ds="http://schemas.openxmlformats.org/officeDocument/2006/customXml" ds:itemID="{2D276E62-80A3-44DD-9BCC-97ED2B99B57F}">
   <ds:schemaRefs>
     <ds:schemaRef ds:uri="http://schemas.microsoft.com/office/2006/metadata/contentType"/>
@@ -5479,4 +6168,22 @@
     <ds:schemaRef ds:uri="http://schemas.microsoft.com/internal/obd"/>
   </ds:schemaRefs>
 </ds:datastoreItem>
+</file>
+
+<file path=customXml/itemProps2.xml><?xml version="1.0" encoding="utf-8"?>
+<ds:datastoreItem xmlns:ds="http://schemas.openxmlformats.org/officeDocument/2006/customXml" ds:itemID="{CDB58277-F8DF-46FF-84EC-EF41B835E69F}">
+  <ds:schemaRefs>
+    <ds:schemaRef ds:uri="http://schemas.microsoft.com/sharepoint/v3/contenttype/forms"/>
+  </ds:schemaRefs>
+</ds:datastoreItem>
+</file>
+
+<file path=customXml/itemProps3.xml><?xml version="1.0" encoding="utf-8"?>
+<ds:datastoreItem xmlns:ds="http://schemas.openxmlformats.org/officeDocument/2006/customXml" ds:itemID="{137651BA-F45C-4845-9AB3-E0A65B39F5E1}">
+  <ds:schemaRefs>
+    <ds:schemaRef ds:uri="http://schemas.microsoft.com/office/2006/metadata/properties"/>
+    <ds:schemaRef ds:uri="http://schemas.microsoft.com/office/infopath/2007/PartnerControls"/>
+    <ds:schemaRef ds:uri="71af3243-3dd4-4a8d-8c0d-dd76da1f02a5"/>
+  </ds:schemaRefs>
+</ds:datastoreItem>
 </file>
</xml_diff>